<commit_message>
view update : check antpeople project
</commit_message>
<xml_diff>
--- a/화면구성20190718.pptx
+++ b/화면구성20190718.pptx
@@ -299,7 +299,7 @@
           <a:p>
             <a:fld id="{47D1B0CD-555B-4F37-851B-650B607EE1CA}" type="datetimeFigureOut">
               <a:rPr lang="ko-KR" altLang="en-US" smtClean="0"/>
-              <a:t>2019-07-18</a:t>
+              <a:t>2019-07-19</a:t>
             </a:fld>
             <a:endParaRPr lang="ko-KR" altLang="en-US"/>
           </a:p>
@@ -469,7 +469,7 @@
           <a:p>
             <a:fld id="{47D1B0CD-555B-4F37-851B-650B607EE1CA}" type="datetimeFigureOut">
               <a:rPr lang="ko-KR" altLang="en-US" smtClean="0"/>
-              <a:t>2019-07-18</a:t>
+              <a:t>2019-07-19</a:t>
             </a:fld>
             <a:endParaRPr lang="ko-KR" altLang="en-US"/>
           </a:p>
@@ -649,7 +649,7 @@
           <a:p>
             <a:fld id="{47D1B0CD-555B-4F37-851B-650B607EE1CA}" type="datetimeFigureOut">
               <a:rPr lang="ko-KR" altLang="en-US" smtClean="0"/>
-              <a:t>2019-07-18</a:t>
+              <a:t>2019-07-19</a:t>
             </a:fld>
             <a:endParaRPr lang="ko-KR" altLang="en-US"/>
           </a:p>
@@ -819,7 +819,7 @@
           <a:p>
             <a:fld id="{47D1B0CD-555B-4F37-851B-650B607EE1CA}" type="datetimeFigureOut">
               <a:rPr lang="ko-KR" altLang="en-US" smtClean="0"/>
-              <a:t>2019-07-18</a:t>
+              <a:t>2019-07-19</a:t>
             </a:fld>
             <a:endParaRPr lang="ko-KR" altLang="en-US"/>
           </a:p>
@@ -1065,7 +1065,7 @@
           <a:p>
             <a:fld id="{47D1B0CD-555B-4F37-851B-650B607EE1CA}" type="datetimeFigureOut">
               <a:rPr lang="ko-KR" altLang="en-US" smtClean="0"/>
-              <a:t>2019-07-18</a:t>
+              <a:t>2019-07-19</a:t>
             </a:fld>
             <a:endParaRPr lang="ko-KR" altLang="en-US"/>
           </a:p>
@@ -1353,7 +1353,7 @@
           <a:p>
             <a:fld id="{47D1B0CD-555B-4F37-851B-650B607EE1CA}" type="datetimeFigureOut">
               <a:rPr lang="ko-KR" altLang="en-US" smtClean="0"/>
-              <a:t>2019-07-18</a:t>
+              <a:t>2019-07-19</a:t>
             </a:fld>
             <a:endParaRPr lang="ko-KR" altLang="en-US"/>
           </a:p>
@@ -1775,7 +1775,7 @@
           <a:p>
             <a:fld id="{47D1B0CD-555B-4F37-851B-650B607EE1CA}" type="datetimeFigureOut">
               <a:rPr lang="ko-KR" altLang="en-US" smtClean="0"/>
-              <a:t>2019-07-18</a:t>
+              <a:t>2019-07-19</a:t>
             </a:fld>
             <a:endParaRPr lang="ko-KR" altLang="en-US"/>
           </a:p>
@@ -1893,7 +1893,7 @@
           <a:p>
             <a:fld id="{47D1B0CD-555B-4F37-851B-650B607EE1CA}" type="datetimeFigureOut">
               <a:rPr lang="ko-KR" altLang="en-US" smtClean="0"/>
-              <a:t>2019-07-18</a:t>
+              <a:t>2019-07-19</a:t>
             </a:fld>
             <a:endParaRPr lang="ko-KR" altLang="en-US"/>
           </a:p>
@@ -1988,7 +1988,7 @@
           <a:p>
             <a:fld id="{47D1B0CD-555B-4F37-851B-650B607EE1CA}" type="datetimeFigureOut">
               <a:rPr lang="ko-KR" altLang="en-US" smtClean="0"/>
-              <a:t>2019-07-18</a:t>
+              <a:t>2019-07-19</a:t>
             </a:fld>
             <a:endParaRPr lang="ko-KR" altLang="en-US"/>
           </a:p>
@@ -2265,7 +2265,7 @@
           <a:p>
             <a:fld id="{47D1B0CD-555B-4F37-851B-650B607EE1CA}" type="datetimeFigureOut">
               <a:rPr lang="ko-KR" altLang="en-US" smtClean="0"/>
-              <a:t>2019-07-18</a:t>
+              <a:t>2019-07-19</a:t>
             </a:fld>
             <a:endParaRPr lang="ko-KR" altLang="en-US"/>
           </a:p>
@@ -2518,7 +2518,7 @@
           <a:p>
             <a:fld id="{47D1B0CD-555B-4F37-851B-650B607EE1CA}" type="datetimeFigureOut">
               <a:rPr lang="ko-KR" altLang="en-US" smtClean="0"/>
-              <a:t>2019-07-18</a:t>
+              <a:t>2019-07-19</a:t>
             </a:fld>
             <a:endParaRPr lang="ko-KR" altLang="en-US"/>
           </a:p>
@@ -2731,7 +2731,7 @@
           <a:p>
             <a:fld id="{47D1B0CD-555B-4F37-851B-650B607EE1CA}" type="datetimeFigureOut">
               <a:rPr lang="ko-KR" altLang="en-US" smtClean="0"/>
-              <a:t>2019-07-18</a:t>
+              <a:t>2019-07-19</a:t>
             </a:fld>
             <a:endParaRPr lang="ko-KR" altLang="en-US"/>
           </a:p>
@@ -5478,6 +5478,107 @@
             <a:pPr marL="0" indent="0">
               <a:buNone/>
             </a:pPr>
+            <a:r>
+              <a:rPr lang="ko-KR" altLang="en-US" sz="2000" dirty="0" smtClean="0"/>
+              <a:t>회원가입 후 </a:t>
+            </a:r>
+            <a:r>
+              <a:rPr lang="en-US" altLang="ko-KR" sz="2000" dirty="0" smtClean="0">
+                <a:sym typeface="Wingdings" pitchFamily="2" charset="2"/>
+              </a:rPr>
+              <a:t> </a:t>
+            </a:r>
+            <a:r>
+              <a:rPr lang="ko-KR" altLang="en-US" sz="2000" dirty="0" err="1" smtClean="0">
+                <a:sym typeface="Wingdings" pitchFamily="2" charset="2"/>
+              </a:rPr>
+              <a:t>확인창</a:t>
+            </a:r>
+            <a:r>
+              <a:rPr lang="en-US" altLang="ko-KR" sz="2000" dirty="0" smtClean="0">
+                <a:sym typeface="Wingdings" pitchFamily="2" charset="2"/>
+              </a:rPr>
+              <a:t>(</a:t>
+            </a:r>
+            <a:r>
+              <a:rPr lang="ko-KR" altLang="en-US" sz="2000" dirty="0" err="1" smtClean="0">
+                <a:sym typeface="Wingdings" pitchFamily="2" charset="2"/>
+              </a:rPr>
+              <a:t>모달</a:t>
+            </a:r>
+            <a:r>
+              <a:rPr lang="ko-KR" altLang="en-US" sz="2000" dirty="0" smtClean="0">
+                <a:sym typeface="Wingdings" pitchFamily="2" charset="2"/>
+              </a:rPr>
+              <a:t> 팝업</a:t>
+            </a:r>
+            <a:r>
+              <a:rPr lang="en-US" altLang="ko-KR" sz="2000" dirty="0" smtClean="0">
+                <a:sym typeface="Wingdings" pitchFamily="2" charset="2"/>
+              </a:rPr>
+              <a:t>, </a:t>
+            </a:r>
+            <a:r>
+              <a:rPr lang="ko-KR" altLang="en-US" sz="2000" dirty="0" err="1" smtClean="0">
+                <a:sym typeface="Wingdings" pitchFamily="2" charset="2"/>
+              </a:rPr>
+              <a:t>빈페이지</a:t>
+            </a:r>
+            <a:r>
+              <a:rPr lang="en-US" altLang="ko-KR" sz="2000" smtClean="0">
+                <a:sym typeface="Wingdings" pitchFamily="2" charset="2"/>
+              </a:rPr>
+              <a:t>)</a:t>
+            </a:r>
+            <a:r>
+              <a:rPr lang="en-US" altLang="ko-KR" sz="2000" smtClean="0">
+                <a:sym typeface="Wingdings" pitchFamily="2" charset="2"/>
+              </a:rPr>
+              <a:t> </a:t>
+            </a:r>
+            <a:r>
+              <a:rPr lang="en-US" altLang="ko-KR" sz="2000" dirty="0" smtClean="0">
+                <a:sym typeface="Wingdings" pitchFamily="2" charset="2"/>
+              </a:rPr>
+              <a:t> </a:t>
+            </a:r>
+            <a:r>
+              <a:rPr lang="ko-KR" altLang="en-US" sz="2000" dirty="0" smtClean="0">
+                <a:sym typeface="Wingdings" pitchFamily="2" charset="2"/>
+              </a:rPr>
+              <a:t>확인버튼으로 넘어감</a:t>
+            </a:r>
+            <a:r>
+              <a:rPr lang="en-US" altLang="ko-KR" sz="2000" dirty="0" smtClean="0">
+                <a:sym typeface="Wingdings" pitchFamily="2" charset="2"/>
+              </a:rPr>
+              <a:t>.</a:t>
+            </a:r>
+          </a:p>
+          <a:p>
+            <a:pPr marL="0" indent="0">
+              <a:buNone/>
+            </a:pPr>
+            <a:endParaRPr lang="en-US" altLang="ko-KR" sz="2000" dirty="0">
+              <a:sym typeface="Wingdings" pitchFamily="2" charset="2"/>
+            </a:endParaRPr>
+          </a:p>
+          <a:p>
+            <a:pPr marL="0" indent="0">
+              <a:buNone/>
+            </a:pPr>
+            <a:endParaRPr lang="en-US" altLang="ko-KR" sz="2000" dirty="0" smtClean="0"/>
+          </a:p>
+          <a:p>
+            <a:pPr marL="0" indent="0">
+              <a:buNone/>
+            </a:pPr>
+            <a:endParaRPr lang="en-US" altLang="ko-KR" sz="2000" dirty="0"/>
+          </a:p>
+          <a:p>
+            <a:pPr marL="0" indent="0">
+              <a:buNone/>
+            </a:pPr>
             <a:endParaRPr lang="ko-KR" altLang="en-US" sz="2000" dirty="0"/>
           </a:p>
         </p:txBody>
@@ -6634,19 +6735,7 @@
               <a:rPr lang="en-US" altLang="ko-KR" sz="1100" dirty="0" smtClean="0">
                 <a:sym typeface="Wingdings" pitchFamily="2" charset="2"/>
               </a:rPr>
-              <a:t>, </a:t>
-            </a:r>
-            <a:r>
-              <a:rPr lang="en-US" altLang="ko-KR" sz="1100" dirty="0" smtClean="0">
-                <a:sym typeface="Wingdings" pitchFamily="2" charset="2"/>
-              </a:rPr>
-              <a:t> update(Ajax</a:t>
-            </a:r>
-            <a:r>
-              <a:rPr lang="en-US" altLang="ko-KR" sz="1100" dirty="0" smtClean="0">
-                <a:sym typeface="Wingdings" pitchFamily="2" charset="2"/>
-              </a:rPr>
-              <a:t>, </a:t>
+              <a:t>,  update(Ajax, </a:t>
             </a:r>
             <a:r>
               <a:rPr lang="en-US" altLang="ko-KR" sz="1100" dirty="0" err="1" smtClean="0">
@@ -6683,13 +6772,7 @@
               <a:rPr lang="en-US" altLang="ko-KR" sz="1100" dirty="0" smtClean="0">
                 <a:sym typeface="Wingdings" pitchFamily="2" charset="2"/>
               </a:rPr>
-              <a:t>:      </a:t>
-            </a:r>
-            <a:r>
-              <a:rPr lang="en-US" altLang="ko-KR" sz="1100" dirty="0" smtClean="0">
-                <a:sym typeface="Wingdings" pitchFamily="2" charset="2"/>
-              </a:rPr>
-              <a:t>board</a:t>
+              <a:t>:      board</a:t>
             </a:r>
             <a:endParaRPr lang="en-US" altLang="ko-KR" sz="1100" dirty="0" smtClean="0"/>
           </a:p>
@@ -6863,11 +6946,7 @@
           <a:p>
             <a:r>
               <a:rPr lang="en-US" altLang="ko-KR" dirty="0" smtClean="0"/>
-              <a:t>2. </a:t>
-            </a:r>
-            <a:r>
-              <a:rPr lang="en-US" altLang="ko-KR" dirty="0" smtClean="0"/>
-              <a:t>Common – </a:t>
+              <a:t>2. Common – </a:t>
             </a:r>
             <a:r>
               <a:rPr lang="ko-KR" altLang="en-US" dirty="0" smtClean="0"/>
@@ -7273,11 +7352,7 @@
           <a:p>
             <a:r>
               <a:rPr lang="en-US" altLang="ko-KR" dirty="0" smtClean="0"/>
-              <a:t>2. </a:t>
-            </a:r>
-            <a:r>
-              <a:rPr lang="en-US" altLang="ko-KR" dirty="0" smtClean="0"/>
-              <a:t>Common – </a:t>
+              <a:t>2. Common – </a:t>
             </a:r>
             <a:r>
               <a:rPr lang="ko-KR" altLang="en-US" dirty="0" err="1" smtClean="0"/>
@@ -8028,11 +8103,7 @@
             </a:r>
             <a:r>
               <a:rPr lang="en-US" altLang="ko-KR" sz="1100" dirty="0" smtClean="0"/>
-              <a:t>: </a:t>
-            </a:r>
-            <a:r>
-              <a:rPr lang="en-US" altLang="ko-KR" sz="1100" dirty="0" smtClean="0"/>
-              <a:t>planning (</a:t>
+              <a:t>: planning (</a:t>
             </a:r>
             <a:r>
               <a:rPr lang="ko-KR" altLang="en-US" sz="1100" dirty="0" err="1" smtClean="0"/>

</xml_diff>